<commit_message>
feat(projektowanie-uniwersalne/project-1): fix image on first slide
</commit_message>
<xml_diff>
--- a/semester-5/projektowanie-uniwersalne/project-1-presentation/medoyed/output/maksym-presentation.pptx
+++ b/semester-5/projektowanie-uniwersalne/project-1-presentation/medoyed/output/maksym-presentation.pptx
@@ -1516,7 +1516,7 @@
           <a:ln/>
         </p:spPr>
         <p:txBody>
-          <a:bodyPr wrap="square" rtlCol="0" anchor="ctr"/>
+          <a:bodyPr wrap="square" rtlCol="0" anchor="t"/>
           <a:lstStyle/>
           <a:p>
             <a:pPr algn="ctr" indent="0" marL="0">
@@ -1555,7 +1555,7 @@
           <a:ln/>
         </p:spPr>
         <p:txBody>
-          <a:bodyPr wrap="square" rtlCol="0" anchor="ctr"/>
+          <a:bodyPr wrap="square" rtlCol="0" anchor="t"/>
           <a:lstStyle/>
           <a:p>
             <a:pPr algn="ctr" indent="0" marL="0">
@@ -1570,7 +1570,7 @@
                 <a:ea typeface="Arial" pitchFamily="34" charset="-122"/>
                 <a:cs typeface="Arial" pitchFamily="34" charset="-120"/>
               </a:rPr>
-              <a:t>[Прізвище]</a:t>
+              <a:t>Мокряков</a:t>
             </a:r>
             <a:endParaRPr lang="en-US" sz="3600" dirty="0"/>
           </a:p>
@@ -1594,7 +1594,7 @@
           <a:ln/>
         </p:spPr>
         <p:txBody>
-          <a:bodyPr wrap="square" rtlCol="0" anchor="ctr"/>
+          <a:bodyPr wrap="square" rtlCol="0" anchor="t"/>
           <a:lstStyle/>
           <a:p>
             <a:pPr algn="ctr" indent="0" marL="0">
@@ -1603,90 +1603,74 @@
             <a:r>
               <a:rPr lang="en-US" sz="2000" dirty="0">
                 <a:solidFill>
-                  <a:srgbClr val="666666"/>
-                </a:solidFill>
-                <a:latin typeface="Arial" pitchFamily="34" charset="0"/>
-                <a:ea typeface="Arial" pitchFamily="34" charset="-122"/>
-                <a:cs typeface="Arial" pitchFamily="34" charset="-120"/>
-              </a:rPr>
-              <a:t>Студент | Програміст | [Твоє хоббі]</a:t>
+                  <a:srgbClr val="555555"/>
+                </a:solidFill>
+                <a:latin typeface="Arial" pitchFamily="34" charset="0"/>
+                <a:ea typeface="Arial" pitchFamily="34" charset="-122"/>
+                <a:cs typeface="Arial" pitchFamily="34" charset="-120"/>
+              </a:rPr>
+              <a:t>Студент | Програміст | Стрілок з луку</a:t>
             </a:r>
             <a:endParaRPr lang="en-US" sz="2000" dirty="0"/>
           </a:p>
         </p:txBody>
       </p:sp>
-      <p:sp>
-        <p:nvSpPr>
-          <p:cNvPr id="5" name="Text 3"/>
-          <p:cNvSpPr/>
-          <p:nvPr/>
-        </p:nvSpPr>
-        <p:spPr>
-          <a:xfrm>
-            <a:off x="3657600" y="4114800"/>
-            <a:ext cx="1828800" cy="914400"/>
-          </a:xfrm>
-          <a:prstGeom prst="rect">
-            <a:avLst/>
-          </a:prstGeom>
-          <a:noFill/>
-          <a:ln/>
-        </p:spPr>
-        <p:txBody>
-          <a:bodyPr wrap="square" rtlCol="0" anchor="ctr"/>
-          <a:lstStyle/>
-          <a:p>
-            <a:pPr algn="ctr" indent="0" marL="0">
-              <a:buNone/>
-            </a:pPr>
-            <a:r>
-              <a:rPr lang="en-US" sz="7200" dirty="0">
-                <a:solidFill>
-                  <a:srgbClr val="000000"/>
-                </a:solidFill>
-              </a:rPr>
-              <a:t>📸</a:t>
-            </a:r>
-            <a:endParaRPr lang="en-US" sz="7200" dirty="0"/>
-          </a:p>
-        </p:txBody>
-      </p:sp>
-      <p:sp>
-        <p:nvSpPr>
-          <p:cNvPr id="6" name="Text 4"/>
-          <p:cNvSpPr/>
-          <p:nvPr/>
-        </p:nvSpPr>
-        <p:spPr>
-          <a:xfrm>
-            <a:off x="3200400" y="5029200"/>
-            <a:ext cx="2743200" cy="365760"/>
-          </a:xfrm>
-          <a:prstGeom prst="rect">
-            <a:avLst/>
-          </a:prstGeom>
-          <a:noFill/>
-          <a:ln/>
-        </p:spPr>
-        <p:txBody>
-          <a:bodyPr wrap="square" rtlCol="0" anchor="ctr"/>
-          <a:lstStyle/>
-          <a:p>
-            <a:pPr algn="ctr" indent="0" marL="0">
-              <a:buNone/>
-            </a:pPr>
-            <a:r>
-              <a:rPr lang="en-US" sz="1200" dirty="0">
-                <a:solidFill>
-                  <a:srgbClr val="999999"/>
-                </a:solidFill>
-                <a:latin typeface="Arial" pitchFamily="34" charset="0"/>
-                <a:ea typeface="Arial" pitchFamily="34" charset="-122"/>
-                <a:cs typeface="Arial" pitchFamily="34" charset="-120"/>
-              </a:rPr>
-              <a:t>Фото профілю</a:t>
-            </a:r>
-            <a:endParaRPr lang="en-US" sz="1200" dirty="0"/>
+      <p:pic>
+        <p:nvPicPr>
+          <p:cNvPr id="5" name="Image 0" descr="/home/maksym/SAN/san-git-hub/semester-5/projektowanie-uniwersalne/project-1-presentation/medoyed/src/shared/assets/img/hobby-img.png">    </p:cNvPr>
+          <p:cNvPicPr>
+            <a:picLocks noChangeAspect="1"/>
+          </p:cNvPicPr>
+          <p:nvPr/>
+        </p:nvPicPr>
+        <p:blipFill>
+          <a:blip r:embed="rId1"/>
+          <a:srcRect l="0" r="0" t="0" b="0"/>
+          <a:stretch/>
+        </p:blipFill>
+        <p:spPr>
+          <a:xfrm>
+            <a:off x="3200400" y="4114800"/>
+            <a:ext cx="2743200" cy="2743200"/>
+          </a:xfrm>
+          <a:prstGeom prst="rect">
+            <a:avLst/>
+          </a:prstGeom>
+        </p:spPr>
+      </p:pic>
+      <p:sp>
+        <p:nvSpPr>
+          <p:cNvPr id="6" name="Text 3"/>
+          <p:cNvSpPr/>
+          <p:nvPr/>
+        </p:nvSpPr>
+        <p:spPr>
+          <a:xfrm>
+            <a:off x="3200400" y="4114800"/>
+            <a:ext cx="2743200" cy="2743200"/>
+          </a:xfrm>
+          <a:prstGeom prst="rect">
+            <a:avLst/>
+          </a:prstGeom>
+          <a:noFill/>
+          <a:ln/>
+        </p:spPr>
+        <p:txBody>
+          <a:bodyPr wrap="square" rtlCol="0" anchor="ctr"/>
+          <a:lstStyle/>
+          <a:p>
+            <a:pPr indent="0" marL="0">
+              <a:buNone/>
+            </a:pPr>
+            <a:r>
+              <a:rPr lang="en-US" sz="100" dirty="0">
+                <a:solidFill>
+                  <a:srgbClr val="FFFFFF"/>
+                </a:solidFill>
+              </a:rPr>
+              <a:t>Фото Максима під час стрільби з луку</a:t>
+            </a:r>
+            <a:endParaRPr lang="en-US" sz="100" dirty="0"/>
           </a:p>
         </p:txBody>
       </p:sp>

</xml_diff>

<commit_message>
feat(projektowanie-uniwersalne/project-1): Proszę dokonać odpowiednich poprawek w prezentacji, dostosowując ją do wymogów dostępności cyfrowej.
</commit_message>
<xml_diff>
--- a/semester-5/projektowanie-uniwersalne/project-1-presentation/medoyed/output/maksym-presentation.pptx
+++ b/semester-5/projektowanie-uniwersalne/project-1-presentation/medoyed/output/maksym-presentation.pptx
@@ -1189,6 +1189,45 @@
           <a:chExt cx="0" cy="0"/>
         </a:xfrm>
       </p:grpSpPr>
+      <p:sp>
+        <p:nvSpPr>
+          <p:cNvPr id="25" name="Slide Number Placeholder 0"/>
+          <p:cNvSpPr>
+            <a:spLocks noGrp="1"/>
+          </p:cNvSpPr>
+          <p:nvPr>
+            <p:ph type="sldNum" sz="quarter" idx="4294967295"/>
+          </p:nvPr>
+        </p:nvSpPr>
+        <p:spPr>
+          <a:xfrm>
+            <a:off x="0" y="0"/>
+            <a:ext cx="800000" cy="300000"/>
+          </a:xfrm>
+          <a:prstGeom prst="rect">
+            <a:avLst/>
+          </a:prstGeom>
+          <a:extLst>
+            <a:ext uri="{C572A759-6A51-4108-AA02-DFA0A04FC94B}">
+              <ma14:wrappingTextBoxFlag xmlns:ma14="http://schemas.microsoft.com/office/mac/drawingml/2011/main" val="0"/>
+            </a:ext>
+          </a:extLst>
+        </p:spPr>
+        <p:txBody>
+          <a:bodyPr/>
+          <a:lstStyle>
+            <a:lvl1pPr/>
+          </a:lstStyle>
+          <a:p>
+            <a:pPr algn="l"/>
+            <a:fld id="{F7021451-1387-4CA6-816F-3879F97B5CBC}" type="slidenum">
+              <a:rPr b="0" lang="en-US"/>
+              <a:t>1000</a:t>
+            </a:fld>
+            <a:endParaRPr lang="en-US"/>
+          </a:p>
+        </p:txBody>
+      </p:sp>
     </p:spTree>
   </p:cSld>
   <p:clrMapOvr>
@@ -1214,6 +1253,45 @@
           <a:chExt cx="0" cy="0"/>
         </a:xfrm>
       </p:grpSpPr>
+      <p:sp>
+        <p:nvSpPr>
+          <p:cNvPr id="25" name="Slide Number Placeholder 0"/>
+          <p:cNvSpPr>
+            <a:spLocks noGrp="1"/>
+          </p:cNvSpPr>
+          <p:nvPr>
+            <p:ph type="sldNum" sz="quarter" idx="4294967295"/>
+          </p:nvPr>
+        </p:nvSpPr>
+        <p:spPr>
+          <a:xfrm>
+            <a:off x="0" y="0"/>
+            <a:ext cx="800000" cy="300000"/>
+          </a:xfrm>
+          <a:prstGeom prst="rect">
+            <a:avLst/>
+          </a:prstGeom>
+          <a:extLst>
+            <a:ext uri="{C572A759-6A51-4108-AA02-DFA0A04FC94B}">
+              <ma14:wrappingTextBoxFlag xmlns:ma14="http://schemas.microsoft.com/office/mac/drawingml/2011/main" val="0"/>
+            </a:ext>
+          </a:extLst>
+        </p:spPr>
+        <p:txBody>
+          <a:bodyPr/>
+          <a:lstStyle>
+            <a:lvl1pPr/>
+          </a:lstStyle>
+          <a:p>
+            <a:pPr algn="l"/>
+            <a:fld id="{F7021451-1387-4CA6-816F-3879F97B5CBC}" type="slidenum">
+              <a:rPr b="0" lang="en-US"/>
+              <a:t>null</a:t>
+            </a:fld>
+            <a:endParaRPr lang="en-US"/>
+          </a:p>
+        </p:txBody>
+      </p:sp>
     </p:spTree>
   </p:cSld>
   <p:clrMap bg1="lt1" tx1="dk1" bg2="lt2" tx2="dk2" accent1="accent1" accent2="accent2" accent3="accent3" accent4="accent4" accent5="accent5" accent6="accent6" hlink="hlink" folHlink="folHlink"/>
@@ -1617,7 +1695,7 @@
       </p:sp>
       <p:pic>
         <p:nvPicPr>
-          <p:cNvPr id="5" name="Image 0" descr="/home/maksym/SAN/san-git-hub/semester-5/projektowanie-uniwersalne/project-1-presentation/medoyed/src/shared/assets/img/hobby-img.png">    </p:cNvPr>
+          <p:cNvPr id="5" name="Image 0" descr="Zdjęcie Maksyma podczas strzelania z łuku">    </p:cNvPr>
           <p:cNvPicPr>
             <a:picLocks noChangeAspect="1"/>
           </p:cNvPicPr>
@@ -1638,42 +1716,6 @@
           </a:prstGeom>
         </p:spPr>
       </p:pic>
-      <p:sp>
-        <p:nvSpPr>
-          <p:cNvPr id="6" name="Text 3"/>
-          <p:cNvSpPr/>
-          <p:nvPr/>
-        </p:nvSpPr>
-        <p:spPr>
-          <a:xfrm>
-            <a:off x="3429000" y="2286000"/>
-            <a:ext cx="2286000" cy="2286000"/>
-          </a:xfrm>
-          <a:prstGeom prst="rect">
-            <a:avLst/>
-          </a:prstGeom>
-          <a:noFill/>
-          <a:ln/>
-        </p:spPr>
-        <p:txBody>
-          <a:bodyPr wrap="square" rtlCol="0" anchor="ctr"/>
-          <a:lstStyle/>
-          <a:p>
-            <a:pPr indent="0" marL="0">
-              <a:buNone/>
-            </a:pPr>
-            <a:r>
-              <a:rPr lang="en-US" sz="100" dirty="0">
-                <a:solidFill>
-                  <a:srgbClr val="FFFFFF"/>
-                </a:solidFill>
-              </a:rPr>
-              <a:t>Zdjęcie Maksyma podczas strzelania z łuku</a:t>
-            </a:r>
-            <a:endParaRPr lang="en-US" sz="100" dirty="0"/>
-          </a:p>
-        </p:txBody>
-      </p:sp>
     </p:spTree>
   </p:cSld>
   <p:clrMapOvr>
@@ -1869,7 +1911,7 @@
       </p:sp>
       <p:pic>
         <p:nvPicPr>
-          <p:cNvPr id="4" name="Image 0" descr="preencoded.png">    </p:cNvPr>
+          <p:cNvPr id="4" name="Image 0" descr="Ilustracja przedstawiająca nowoczesne technologie frontend - kolorowe ikony frameworków i narzędzi webowych">    </p:cNvPr>
           <p:cNvPicPr>
             <a:picLocks noChangeAspect="1"/>
           </p:cNvPicPr>
@@ -1918,7 +1960,7 @@
             <a:r>
               <a:rPr lang="en-US" sz="1600" i="1" dirty="0">
                 <a:solidFill>
-                  <a:srgbClr val="666666"/>
+                  <a:srgbClr val="555555"/>
                 </a:solidFill>
                 <a:latin typeface="Arial" pitchFamily="34" charset="0"/>
                 <a:ea typeface="Arial" pitchFamily="34" charset="-122"/>
@@ -1927,6 +1969,45 @@
               <a:t>Interesuję się technologiami i tworzeniem aplikacji webowych</a:t>
             </a:r>
             <a:endParaRPr lang="en-US" sz="1600" dirty="0"/>
+          </a:p>
+        </p:txBody>
+      </p:sp>
+      <p:sp>
+        <p:nvSpPr>
+          <p:cNvPr id="25" name="Slide Number Placeholder 0"/>
+          <p:cNvSpPr>
+            <a:spLocks noGrp="1"/>
+          </p:cNvSpPr>
+          <p:nvPr>
+            <p:ph type="sldNum" sz="quarter" idx="4294967295"/>
+          </p:nvPr>
+        </p:nvSpPr>
+        <p:spPr>
+          <a:xfrm>
+            <a:off x="0" y="0"/>
+            <a:ext cx="800000" cy="300000"/>
+          </a:xfrm>
+          <a:prstGeom prst="rect">
+            <a:avLst/>
+          </a:prstGeom>
+          <a:extLst>
+            <a:ext uri="{C572A759-6A51-4108-AA02-DFA0A04FC94B}">
+              <ma14:wrappingTextBoxFlag xmlns:ma14="http://schemas.microsoft.com/office/mac/drawingml/2011/main" val="0"/>
+            </a:ext>
+          </a:extLst>
+        </p:spPr>
+        <p:txBody>
+          <a:bodyPr/>
+          <a:lstStyle>
+            <a:lvl1pPr/>
+          </a:lstStyle>
+          <a:p>
+            <a:pPr algn="l"/>
+            <a:fld id="{F7021451-1387-4CA6-816F-3879F97B5CBC}" type="slidenum">
+              <a:rPr b="0" lang="en-US"/>
+              <a:t>2</a:t>
+            </a:fld>
+            <a:endParaRPr lang="en-US"/>
           </a:p>
         </p:txBody>
       </p:sp>
@@ -2131,7 +2212,7 @@
             <a:r>
               <a:rPr lang="en-US" sz="1600" dirty="0">
                 <a:solidFill>
-                  <a:srgbClr val="666666"/>
+                  <a:srgbClr val="555555"/>
                 </a:solidFill>
                 <a:latin typeface="Arial" pitchFamily="34" charset="0"/>
                 <a:ea typeface="Arial" pitchFamily="34" charset="-122"/>
@@ -2285,6 +2366,45 @@
               <a:t>• Rok studiów: 3   • Rok rozpoczęcia: 2023   • Przewidywany rok ukończenia: 2027</a:t>
             </a:r>
             <a:endParaRPr lang="en-US" sz="1600" dirty="0"/>
+          </a:p>
+        </p:txBody>
+      </p:sp>
+      <p:sp>
+        <p:nvSpPr>
+          <p:cNvPr id="25" name="Slide Number Placeholder 0"/>
+          <p:cNvSpPr>
+            <a:spLocks noGrp="1"/>
+          </p:cNvSpPr>
+          <p:nvPr>
+            <p:ph type="sldNum" sz="quarter" idx="4294967295"/>
+          </p:nvPr>
+        </p:nvSpPr>
+        <p:spPr>
+          <a:xfrm>
+            <a:off x="0" y="0"/>
+            <a:ext cx="800000" cy="300000"/>
+          </a:xfrm>
+          <a:prstGeom prst="rect">
+            <a:avLst/>
+          </a:prstGeom>
+          <a:extLst>
+            <a:ext uri="{C572A759-6A51-4108-AA02-DFA0A04FC94B}">
+              <ma14:wrappingTextBoxFlag xmlns:ma14="http://schemas.microsoft.com/office/mac/drawingml/2011/main" val="0"/>
+            </a:ext>
+          </a:extLst>
+        </p:spPr>
+        <p:txBody>
+          <a:bodyPr/>
+          <a:lstStyle>
+            <a:lvl1pPr/>
+          </a:lstStyle>
+          <a:p>
+            <a:pPr algn="l"/>
+            <a:fld id="{F7021451-1387-4CA6-816F-3879F97B5CBC}" type="slidenum">
+              <a:rPr b="0" lang="en-US"/>
+              <a:t>3</a:t>
+            </a:fld>
+            <a:endParaRPr lang="en-US"/>
           </a:p>
         </p:txBody>
       </p:sp>
@@ -2464,7 +2584,7 @@
       </p:sp>
       <p:pic>
         <p:nvPicPr>
-          <p:cNvPr id="6" name="Image 0" descr="preencoded.png">    </p:cNvPr>
+          <p:cNvPr id="6" name="Image 0" descr="Zdjęcie tarcze strzelniczej z łucznictwa - widoczne kolorowe kręgi docelowe i strzały">    </p:cNvPr>
           <p:cNvPicPr>
             <a:picLocks noChangeAspect="1"/>
           </p:cNvPicPr>
@@ -2591,7 +2711,7 @@
       </p:sp>
       <p:pic>
         <p:nvPicPr>
-          <p:cNvPr id="10" name="Image 1" descr="preencoded.png">    </p:cNvPr>
+          <p:cNvPr id="10" name="Image 1" descr="Widok sali siłowni z hantlami i sprzętem do ćwiczeń">    </p:cNvPr>
           <p:cNvPicPr>
             <a:picLocks noChangeAspect="1"/>
           </p:cNvPicPr>
@@ -2640,7 +2760,7 @@
             <a:r>
               <a:rPr lang="en-US" sz="1400" i="1" dirty="0">
                 <a:solidFill>
-                  <a:srgbClr val="666666"/>
+                  <a:srgbClr val="555555"/>
                 </a:solidFill>
                 <a:latin typeface="Arial" pitchFamily="34" charset="0"/>
                 <a:ea typeface="Arial" pitchFamily="34" charset="-122"/>
@@ -2649,6 +2769,45 @@
               <a:t>Moje hobby pomaga mi rozwijać się wszechstronnie i znajdować równowagę</a:t>
             </a:r>
             <a:endParaRPr lang="en-US" sz="1400" dirty="0"/>
+          </a:p>
+        </p:txBody>
+      </p:sp>
+      <p:sp>
+        <p:nvSpPr>
+          <p:cNvPr id="25" name="Slide Number Placeholder 0"/>
+          <p:cNvSpPr>
+            <a:spLocks noGrp="1"/>
+          </p:cNvSpPr>
+          <p:nvPr>
+            <p:ph type="sldNum" sz="quarter" idx="4294967295"/>
+          </p:nvPr>
+        </p:nvSpPr>
+        <p:spPr>
+          <a:xfrm>
+            <a:off x="0" y="0"/>
+            <a:ext cx="800000" cy="300000"/>
+          </a:xfrm>
+          <a:prstGeom prst="rect">
+            <a:avLst/>
+          </a:prstGeom>
+          <a:extLst>
+            <a:ext uri="{C572A759-6A51-4108-AA02-DFA0A04FC94B}">
+              <ma14:wrappingTextBoxFlag xmlns:ma14="http://schemas.microsoft.com/office/mac/drawingml/2011/main" val="0"/>
+            </a:ext>
+          </a:extLst>
+        </p:spPr>
+        <p:txBody>
+          <a:bodyPr/>
+          <a:lstStyle>
+            <a:lvl1pPr/>
+          </a:lstStyle>
+          <a:p>
+            <a:pPr algn="l"/>
+            <a:fld id="{F7021451-1387-4CA6-816F-3879F97B5CBC}" type="slidenum">
+              <a:rPr b="0" lang="en-US"/>
+              <a:t>4</a:t>
+            </a:fld>
+            <a:endParaRPr lang="en-US"/>
           </a:p>
         </p:txBody>
       </p:sp>
@@ -3012,7 +3171,7 @@
             <a:r>
               <a:rPr lang="en-US" sz="1600" dirty="0">
                 <a:solidFill>
-                  <a:srgbClr val="666666"/>
+                  <a:srgbClr val="555555"/>
                 </a:solidFill>
                 <a:latin typeface="Arial" pitchFamily="34" charset="0"/>
                 <a:ea typeface="Arial" pitchFamily="34" charset="-122"/>
@@ -3021,6 +3180,45 @@
               <a:t>⏱️ Doświadczenie w programowaniu: 2+ lata</a:t>
             </a:r>
             <a:endParaRPr lang="en-US" sz="1600" dirty="0"/>
+          </a:p>
+        </p:txBody>
+      </p:sp>
+      <p:sp>
+        <p:nvSpPr>
+          <p:cNvPr id="25" name="Slide Number Placeholder 0"/>
+          <p:cNvSpPr>
+            <a:spLocks noGrp="1"/>
+          </p:cNvSpPr>
+          <p:nvPr>
+            <p:ph type="sldNum" sz="quarter" idx="4294967295"/>
+          </p:nvPr>
+        </p:nvSpPr>
+        <p:spPr>
+          <a:xfrm>
+            <a:off x="0" y="0"/>
+            <a:ext cx="800000" cy="300000"/>
+          </a:xfrm>
+          <a:prstGeom prst="rect">
+            <a:avLst/>
+          </a:prstGeom>
+          <a:extLst>
+            <a:ext uri="{C572A759-6A51-4108-AA02-DFA0A04FC94B}">
+              <ma14:wrappingTextBoxFlag xmlns:ma14="http://schemas.microsoft.com/office/mac/drawingml/2011/main" val="0"/>
+            </a:ext>
+          </a:extLst>
+        </p:spPr>
+        <p:txBody>
+          <a:bodyPr/>
+          <a:lstStyle>
+            <a:lvl1pPr/>
+          </a:lstStyle>
+          <a:p>
+            <a:pPr algn="l"/>
+            <a:fld id="{F7021451-1387-4CA6-816F-3879F97B5CBC}" type="slidenum">
+              <a:rPr b="0" lang="en-US"/>
+              <a:t>5</a:t>
+            </a:fld>
+            <a:endParaRPr lang="en-US"/>
           </a:p>
         </p:txBody>
       </p:sp>
@@ -3422,6 +3620,45 @@
           </a:p>
         </p:txBody>
       </p:sp>
+      <p:sp>
+        <p:nvSpPr>
+          <p:cNvPr id="25" name="Slide Number Placeholder 0"/>
+          <p:cNvSpPr>
+            <a:spLocks noGrp="1"/>
+          </p:cNvSpPr>
+          <p:nvPr>
+            <p:ph type="sldNum" sz="quarter" idx="4294967295"/>
+          </p:nvPr>
+        </p:nvSpPr>
+        <p:spPr>
+          <a:xfrm>
+            <a:off x="0" y="0"/>
+            <a:ext cx="800000" cy="300000"/>
+          </a:xfrm>
+          <a:prstGeom prst="rect">
+            <a:avLst/>
+          </a:prstGeom>
+          <a:extLst>
+            <a:ext uri="{C572A759-6A51-4108-AA02-DFA0A04FC94B}">
+              <ma14:wrappingTextBoxFlag xmlns:ma14="http://schemas.microsoft.com/office/mac/drawingml/2011/main" val="0"/>
+            </a:ext>
+          </a:extLst>
+        </p:spPr>
+        <p:txBody>
+          <a:bodyPr/>
+          <a:lstStyle>
+            <a:lvl1pPr/>
+          </a:lstStyle>
+          <a:p>
+            <a:pPr algn="l"/>
+            <a:fld id="{F7021451-1387-4CA6-816F-3879F97B5CBC}" type="slidenum">
+              <a:rPr b="0" lang="en-US"/>
+              <a:t>6</a:t>
+            </a:fld>
+            <a:endParaRPr lang="en-US"/>
+          </a:p>
+        </p:txBody>
+      </p:sp>
     </p:spTree>
   </p:cSld>
   <p:clrMapOvr>
@@ -4137,6 +4374,45 @@
           </a:p>
         </p:txBody>
       </p:sp>
+      <p:sp>
+        <p:nvSpPr>
+          <p:cNvPr id="25" name="Slide Number Placeholder 0"/>
+          <p:cNvSpPr>
+            <a:spLocks noGrp="1"/>
+          </p:cNvSpPr>
+          <p:nvPr>
+            <p:ph type="sldNum" sz="quarter" idx="4294967295"/>
+          </p:nvPr>
+        </p:nvSpPr>
+        <p:spPr>
+          <a:xfrm>
+            <a:off x="0" y="0"/>
+            <a:ext cx="800000" cy="300000"/>
+          </a:xfrm>
+          <a:prstGeom prst="rect">
+            <a:avLst/>
+          </a:prstGeom>
+          <a:extLst>
+            <a:ext uri="{C572A759-6A51-4108-AA02-DFA0A04FC94B}">
+              <ma14:wrappingTextBoxFlag xmlns:ma14="http://schemas.microsoft.com/office/mac/drawingml/2011/main" val="0"/>
+            </a:ext>
+          </a:extLst>
+        </p:spPr>
+        <p:txBody>
+          <a:bodyPr/>
+          <a:lstStyle>
+            <a:lvl1pPr/>
+          </a:lstStyle>
+          <a:p>
+            <a:pPr algn="l"/>
+            <a:fld id="{F7021451-1387-4CA6-816F-3879F97B5CBC}" type="slidenum">
+              <a:rPr b="0" lang="en-US"/>
+              <a:t>7</a:t>
+            </a:fld>
+            <a:endParaRPr lang="en-US"/>
+          </a:p>
+        </p:txBody>
+      </p:sp>
     </p:spTree>
   </p:cSld>
   <p:clrMapOvr>
@@ -4581,6 +4857,45 @@
               <a:t>Dziękuję za uwagę!</a:t>
             </a:r>
             <a:endParaRPr lang="en-US" sz="2400" dirty="0"/>
+          </a:p>
+        </p:txBody>
+      </p:sp>
+      <p:sp>
+        <p:nvSpPr>
+          <p:cNvPr id="25" name="Slide Number Placeholder 0"/>
+          <p:cNvSpPr>
+            <a:spLocks noGrp="1"/>
+          </p:cNvSpPr>
+          <p:nvPr>
+            <p:ph type="sldNum" sz="quarter" idx="4294967295"/>
+          </p:nvPr>
+        </p:nvSpPr>
+        <p:spPr>
+          <a:xfrm>
+            <a:off x="0" y="0"/>
+            <a:ext cx="800000" cy="300000"/>
+          </a:xfrm>
+          <a:prstGeom prst="rect">
+            <a:avLst/>
+          </a:prstGeom>
+          <a:extLst>
+            <a:ext uri="{C572A759-6A51-4108-AA02-DFA0A04FC94B}">
+              <ma14:wrappingTextBoxFlag xmlns:ma14="http://schemas.microsoft.com/office/mac/drawingml/2011/main" val="0"/>
+            </a:ext>
+          </a:extLst>
+        </p:spPr>
+        <p:txBody>
+          <a:bodyPr/>
+          <a:lstStyle>
+            <a:lvl1pPr/>
+          </a:lstStyle>
+          <a:p>
+            <a:pPr algn="l"/>
+            <a:fld id="{F7021451-1387-4CA6-816F-3879F97B5CBC}" type="slidenum">
+              <a:rPr b="0" lang="en-US"/>
+              <a:t>8</a:t>
+            </a:fld>
+            <a:endParaRPr lang="en-US"/>
           </a:p>
         </p:txBody>
       </p:sp>

</xml_diff>